<commit_message>
Disability Barriers - refined speaking notes Feshed out the automted testing material Many refinements, none major
</commit_message>
<xml_diff>
--- a/Digital Product Innovation in the Public Service-TRAN-hl.pptx
+++ b/Digital Product Innovation in the Public Service-TRAN-hl.pptx
@@ -149,7 +149,7 @@
   </p:defaultTextStyle>
   <p:extLst>
     <p:ext uri="{EFAFB233-063F-42B5-8137-9DF3F51BA10A}">
-      <p15:sldGuideLst xmlns="" xmlns:p15="http://schemas.microsoft.com/office/powerpoint/2012/main">
+      <p15:sldGuideLst xmlns:p15="http://schemas.microsoft.com/office/powerpoint/2012/main" xmlns="">
         <p15:guide id="1" orient="horz" pos="2160">
           <p15:clr>
             <a:srgbClr val="A4A3A4"/>
@@ -248,7 +248,7 @@
           <a:p>
             <a:fld id="{4FE63C12-9747-4331-AD85-87339BD4C845}" type="datetimeFigureOut">
               <a:rPr lang="en-CA" smtClean="0"/>
-              <a:t>2017-12-05</a:t>
+              <a:t>2017-12-06</a:t>
             </a:fld>
             <a:endParaRPr lang="en-CA"/>
           </a:p>
@@ -3589,7 +3589,15 @@
             </a:pPr>
             <a:r>
               <a:rPr lang="en-CA" dirty="0" smtClean="0"/>
-              <a:t>	We might allow for the contracted resource to provide a good and strong reason if some accessibility</a:t>
+              <a:t>	We might </a:t>
+            </a:r>
+            <a:r>
+              <a:rPr lang="en-CA" dirty="0" smtClean="0"/>
+              <a:t>want to allow </a:t>
+            </a:r>
+            <a:r>
+              <a:rPr lang="en-CA" dirty="0" smtClean="0"/>
+              <a:t>for the contracted resource to provide a good and strong reason if some accessibility</a:t>
             </a:r>
             <a:r>
               <a:rPr lang="en-CA" baseline="0" dirty="0" smtClean="0"/>
@@ -3732,13 +3740,10 @@
               <a:t>Agile and it’s scrum/sprint model of delivery lends itself well here.  Waterfall approaches will need to ensure that accessibility is NOT an afterthought but built in throughout  each </a:t>
             </a:r>
             <a:r>
-              <a:rPr lang="en-CA" dirty="0" err="1" smtClean="0"/>
-              <a:t>subprocess</a:t>
-            </a:r>
-            <a:r>
-              <a:rPr lang="en-CA" dirty="0" smtClean="0"/>
-              <a:t>.</a:t>
-            </a:r>
+              <a:rPr lang="en-CA" dirty="0" smtClean="0"/>
+              <a:t>sub process.</a:t>
+            </a:r>
+            <a:endParaRPr lang="en-CA" dirty="0" smtClean="0"/>
           </a:p>
           <a:p>
             <a:pPr marL="0" marR="0" indent="0" algn="l" defTabSz="914400" rtl="0" eaLnBrk="1" fontAlgn="auto" latinLnBrk="0" hangingPunct="1">
@@ -4408,13 +4413,8 @@
             </a:r>
             <a:r>
               <a:rPr lang="en-CA" dirty="0" smtClean="0"/>
-              <a:t> Desktop Access (voice </a:t>
-            </a:r>
-            <a:r>
-              <a:rPr lang="en-CA" dirty="0" smtClean="0"/>
-              <a:t>rendering)m</a:t>
-            </a:r>
-            <a:endParaRPr lang="en-CA" dirty="0" smtClean="0"/>
+              <a:t> Desktop Access (voice rendering)m</a:t>
+            </a:r>
           </a:p>
           <a:p>
             <a:pPr lvl="2"/>
@@ -4549,8 +4549,212 @@
           <a:bodyPr/>
           <a:lstStyle/>
           <a:p>
+            <a:endParaRPr lang="en-CA" dirty="0" smtClean="0"/>
+          </a:p>
+          <a:p>
+            <a:r>
+              <a:rPr lang="en-CA" dirty="0" smtClean="0"/>
+              <a:t>AADT</a:t>
+            </a:r>
+          </a:p>
+          <a:p>
+            <a:r>
+              <a:rPr lang="en-CA" sz="1200" kern="1200" dirty="0" smtClean="0">
+                <a:solidFill>
+                  <a:schemeClr val="tx1"/>
+                </a:solidFill>
+                <a:effectLst/>
+                <a:latin typeface="+mn-lt"/>
+                <a:ea typeface="+mn-ea"/>
+                <a:cs typeface="+mn-cs"/>
+              </a:rPr>
+              <a:t>Integrates into existing test suites and frameworks:</a:t>
+            </a:r>
+            <a:endParaRPr lang="en-CA" sz="1400" kern="1200" dirty="0" smtClean="0">
+              <a:solidFill>
+                <a:schemeClr val="tx1"/>
+              </a:solidFill>
+              <a:effectLst/>
+              <a:latin typeface="+mn-lt"/>
+              <a:ea typeface="+mn-ea"/>
+              <a:cs typeface="+mn-cs"/>
+            </a:endParaRPr>
+          </a:p>
+          <a:p>
             <a:pPr lvl="1"/>
-            <a:endParaRPr lang="en-CA" dirty="0" smtClean="0"/>
+            <a:r>
+              <a:rPr lang="en-CA" sz="1200" kern="1200" dirty="0" smtClean="0">
+                <a:solidFill>
+                  <a:schemeClr val="tx1"/>
+                </a:solidFill>
+                <a:effectLst/>
+                <a:latin typeface="+mn-lt"/>
+                <a:ea typeface="+mn-ea"/>
+                <a:cs typeface="+mn-cs"/>
+              </a:rPr>
+              <a:t>Nemo</a:t>
+            </a:r>
+            <a:endParaRPr lang="en-CA" sz="1400" kern="1200" dirty="0" smtClean="0">
+              <a:solidFill>
+                <a:schemeClr val="tx1"/>
+              </a:solidFill>
+              <a:effectLst/>
+              <a:latin typeface="+mn-lt"/>
+              <a:ea typeface="+mn-ea"/>
+              <a:cs typeface="+mn-cs"/>
+            </a:endParaRPr>
+          </a:p>
+          <a:p>
+            <a:pPr lvl="1"/>
+            <a:r>
+              <a:rPr lang="en-CA" sz="1200" kern="1200" dirty="0" err="1" smtClean="0">
+                <a:solidFill>
+                  <a:schemeClr val="tx1"/>
+                </a:solidFill>
+                <a:effectLst/>
+                <a:latin typeface="+mn-lt"/>
+                <a:ea typeface="+mn-ea"/>
+                <a:cs typeface="+mn-cs"/>
+              </a:rPr>
+              <a:t>NightwatchJS</a:t>
+            </a:r>
+            <a:endParaRPr lang="en-CA" sz="1200" kern="1200" dirty="0" smtClean="0">
+              <a:solidFill>
+                <a:schemeClr val="tx1"/>
+              </a:solidFill>
+              <a:effectLst/>
+              <a:latin typeface="+mn-lt"/>
+              <a:ea typeface="+mn-ea"/>
+              <a:cs typeface="+mn-cs"/>
+            </a:endParaRPr>
+          </a:p>
+          <a:p>
+            <a:pPr lvl="1"/>
+            <a:endParaRPr lang="en-CA" sz="1200" kern="1200" dirty="0" smtClean="0">
+              <a:solidFill>
+                <a:schemeClr val="tx1"/>
+              </a:solidFill>
+              <a:effectLst/>
+              <a:latin typeface="+mn-lt"/>
+              <a:ea typeface="+mn-ea"/>
+              <a:cs typeface="+mn-cs"/>
+            </a:endParaRPr>
+          </a:p>
+          <a:p>
+            <a:r>
+              <a:rPr lang="en-CA" sz="1200" kern="1200" dirty="0" err="1" smtClean="0">
+                <a:solidFill>
+                  <a:schemeClr val="tx1"/>
+                </a:solidFill>
+                <a:effectLst/>
+                <a:latin typeface="+mn-lt"/>
+                <a:ea typeface="+mn-ea"/>
+                <a:cs typeface="+mn-cs"/>
+              </a:rPr>
+              <a:t>Tanaguru</a:t>
+            </a:r>
+            <a:endParaRPr lang="en-CA" sz="1200" kern="1200" dirty="0" smtClean="0">
+              <a:solidFill>
+                <a:schemeClr val="tx1"/>
+              </a:solidFill>
+              <a:effectLst/>
+              <a:latin typeface="+mn-lt"/>
+              <a:ea typeface="+mn-ea"/>
+              <a:cs typeface="+mn-cs"/>
+            </a:endParaRPr>
+          </a:p>
+          <a:p>
+            <a:pPr lvl="1"/>
+            <a:r>
+              <a:rPr lang="en-CA" dirty="0" err="1" smtClean="0"/>
+              <a:t>Tanaguru</a:t>
+            </a:r>
+            <a:r>
+              <a:rPr lang="en-CA" dirty="0" smtClean="0"/>
+              <a:t> automates 167 accessibility tests (WCAG, Section 508, </a:t>
+            </a:r>
+            <a:r>
+              <a:rPr lang="en-CA" dirty="0" err="1" smtClean="0"/>
+              <a:t>AccessiWeb</a:t>
+            </a:r>
+            <a:r>
+              <a:rPr lang="en-CA" dirty="0" smtClean="0"/>
+              <a:t>).</a:t>
+            </a:r>
+            <a:br>
+              <a:rPr lang="en-CA" dirty="0" smtClean="0"/>
+            </a:br>
+            <a:r>
+              <a:rPr lang="en-CA" dirty="0" smtClean="0"/>
+              <a:t>Evaluating a page, an entire site or a web application is reliable, intuitive and self accessible.</a:t>
+            </a:r>
+          </a:p>
+          <a:p>
+            <a:pPr lvl="1"/>
+            <a:r>
+              <a:rPr lang="en-CA" dirty="0" smtClean="0"/>
+              <a:t>Scenario audit even lets you control different states of the same page.</a:t>
+            </a:r>
+            <a:endParaRPr lang="en-CA" sz="1200" kern="1200" dirty="0" smtClean="0">
+              <a:solidFill>
+                <a:schemeClr val="tx1"/>
+              </a:solidFill>
+              <a:effectLst/>
+              <a:latin typeface="+mn-lt"/>
+              <a:ea typeface="+mn-ea"/>
+              <a:cs typeface="+mn-cs"/>
+            </a:endParaRPr>
+          </a:p>
+          <a:p>
+            <a:pPr lvl="1"/>
+            <a:endParaRPr lang="en-CA" sz="1200" kern="1200" dirty="0" smtClean="0">
+              <a:solidFill>
+                <a:schemeClr val="tx1"/>
+              </a:solidFill>
+              <a:effectLst/>
+              <a:latin typeface="+mn-lt"/>
+              <a:ea typeface="+mn-ea"/>
+              <a:cs typeface="+mn-cs"/>
+            </a:endParaRPr>
+          </a:p>
+          <a:p>
+            <a:pPr lvl="1"/>
+            <a:r>
+              <a:rPr lang="en-CA" sz="1200" kern="1200" dirty="0" smtClean="0">
+                <a:solidFill>
+                  <a:schemeClr val="tx1"/>
+                </a:solidFill>
+                <a:effectLst/>
+                <a:latin typeface="+mn-lt"/>
+                <a:ea typeface="+mn-ea"/>
+                <a:cs typeface="+mn-cs"/>
+              </a:rPr>
+              <a:t>And its fork “</a:t>
+            </a:r>
+            <a:r>
+              <a:rPr lang="en-CA" sz="1200" kern="1200" dirty="0" err="1" smtClean="0">
+                <a:solidFill>
+                  <a:schemeClr val="tx1"/>
+                </a:solidFill>
+                <a:effectLst/>
+                <a:latin typeface="+mn-lt"/>
+                <a:ea typeface="+mn-ea"/>
+                <a:cs typeface="+mn-cs"/>
+              </a:rPr>
+              <a:t>Asqatasun</a:t>
+            </a:r>
+            <a:r>
+              <a:rPr lang="en-CA" sz="1200" kern="1200" dirty="0" smtClean="0">
+                <a:solidFill>
+                  <a:schemeClr val="tx1"/>
+                </a:solidFill>
+                <a:effectLst/>
+                <a:latin typeface="+mn-lt"/>
+                <a:ea typeface="+mn-ea"/>
+                <a:cs typeface="+mn-cs"/>
+              </a:rPr>
+              <a:t>” which integrates through Jenkins Plugin and Docker image.</a:t>
+            </a:r>
           </a:p>
         </p:txBody>
       </p:sp>
@@ -5092,7 +5296,27 @@
           <a:p>
             <a:r>
               <a:rPr lang="en-CA" baseline="0" dirty="0" smtClean="0"/>
-              <a:t>Advocates … businesses, technology, it’s more “in your face”  (HEIDI: Can we refine this – I’m not sure what this is meant to convey?) [Heidi] Gav, it is just some conversation point … most designers build toward one kind of barrier group, still blocking use for others.</a:t>
+              <a:t>Advocates … businesses, technology, it’s more “in your face</a:t>
+            </a:r>
+            <a:r>
+              <a:rPr lang="en-CA" baseline="0" dirty="0" smtClean="0"/>
+              <a:t>”.  By focusing on a particular higher profile disability we risk ignoring or even introducing other barriers.</a:t>
+            </a:r>
+          </a:p>
+          <a:p>
+            <a:endParaRPr lang="en-CA" baseline="0" dirty="0" smtClean="0"/>
+          </a:p>
+          <a:p>
+            <a:endParaRPr lang="en-CA" baseline="0" dirty="0" smtClean="0"/>
+          </a:p>
+          <a:p>
+            <a:r>
+              <a:rPr lang="en-CA" baseline="0" dirty="0" smtClean="0"/>
+              <a:t>(</a:t>
+            </a:r>
+            <a:r>
+              <a:rPr lang="en-CA" baseline="0" dirty="0" smtClean="0"/>
+              <a:t>HEIDI: Can we refine this – I’m not sure what this is meant to convey?) [Heidi] Gav, it is just some conversation point … most designers build toward one kind of barrier group, still blocking use for others.</a:t>
             </a:r>
             <a:endParaRPr lang="en-CA" dirty="0" smtClean="0"/>
           </a:p>
@@ -6020,7 +6244,7 @@
           <a:p>
             <a:fld id="{5DDB1DE6-DCFF-48D7-9CC0-C561253D4BC1}" type="datetimeFigureOut">
               <a:rPr lang="en-CA" smtClean="0"/>
-              <a:t>2017-12-05</a:t>
+              <a:t>2017-12-06</a:t>
             </a:fld>
             <a:endParaRPr lang="en-CA"/>
           </a:p>
@@ -6224,7 +6448,7 @@
           <a:p>
             <a:fld id="{5DDB1DE6-DCFF-48D7-9CC0-C561253D4BC1}" type="datetimeFigureOut">
               <a:rPr lang="en-CA" smtClean="0"/>
-              <a:t>2017-12-05</a:t>
+              <a:t>2017-12-06</a:t>
             </a:fld>
             <a:endParaRPr lang="en-CA"/>
           </a:p>
@@ -6422,7 +6646,7 @@
           <a:p>
             <a:fld id="{5DDB1DE6-DCFF-48D7-9CC0-C561253D4BC1}" type="datetimeFigureOut">
               <a:rPr lang="en-CA" smtClean="0"/>
-              <a:t>2017-12-05</a:t>
+              <a:t>2017-12-06</a:t>
             </a:fld>
             <a:endParaRPr lang="en-CA"/>
           </a:p>
@@ -6740,7 +6964,7 @@
           <a:p>
             <a:fld id="{5DDB1DE6-DCFF-48D7-9CC0-C561253D4BC1}" type="datetimeFigureOut">
               <a:rPr lang="en-CA" smtClean="0"/>
-              <a:t>2017-12-05</a:t>
+              <a:t>2017-12-06</a:t>
             </a:fld>
             <a:endParaRPr lang="en-CA"/>
           </a:p>
@@ -7052,7 +7276,7 @@
           <a:p>
             <a:fld id="{5DDB1DE6-DCFF-48D7-9CC0-C561253D4BC1}" type="datetimeFigureOut">
               <a:rPr lang="en-CA" smtClean="0"/>
-              <a:t>2017-12-05</a:t>
+              <a:t>2017-12-06</a:t>
             </a:fld>
             <a:endParaRPr lang="en-CA"/>
           </a:p>
@@ -7498,7 +7722,7 @@
           <a:p>
             <a:fld id="{5DDB1DE6-DCFF-48D7-9CC0-C561253D4BC1}" type="datetimeFigureOut">
               <a:rPr lang="en-CA" smtClean="0"/>
-              <a:t>2017-12-05</a:t>
+              <a:t>2017-12-06</a:t>
             </a:fld>
             <a:endParaRPr lang="en-CA"/>
           </a:p>
@@ -7640,7 +7864,7 @@
           <a:p>
             <a:fld id="{5DDB1DE6-DCFF-48D7-9CC0-C561253D4BC1}" type="datetimeFigureOut">
               <a:rPr lang="en-CA" smtClean="0"/>
-              <a:t>2017-12-05</a:t>
+              <a:t>2017-12-06</a:t>
             </a:fld>
             <a:endParaRPr lang="en-CA"/>
           </a:p>
@@ -7759,7 +7983,7 @@
           <a:p>
             <a:fld id="{5DDB1DE6-DCFF-48D7-9CC0-C561253D4BC1}" type="datetimeFigureOut">
               <a:rPr lang="en-CA" smtClean="0"/>
-              <a:t>2017-12-05</a:t>
+              <a:t>2017-12-06</a:t>
             </a:fld>
             <a:endParaRPr lang="en-CA"/>
           </a:p>
@@ -8060,7 +8284,7 @@
           <a:p>
             <a:fld id="{5DDB1DE6-DCFF-48D7-9CC0-C561253D4BC1}" type="datetimeFigureOut">
               <a:rPr lang="en-CA" smtClean="0"/>
-              <a:t>2017-12-05</a:t>
+              <a:t>2017-12-06</a:t>
             </a:fld>
             <a:endParaRPr lang="en-CA"/>
           </a:p>
@@ -8337,7 +8561,7 @@
           <a:p>
             <a:fld id="{5DDB1DE6-DCFF-48D7-9CC0-C561253D4BC1}" type="datetimeFigureOut">
               <a:rPr lang="en-CA" smtClean="0"/>
-              <a:t>2017-12-05</a:t>
+              <a:t>2017-12-06</a:t>
             </a:fld>
             <a:endParaRPr lang="en-CA"/>
           </a:p>
@@ -15923,11 +16147,7 @@
           <a:p>
             <a:r>
               <a:rPr lang="en-CA" dirty="0" smtClean="0"/>
-              <a:t>Service Design project focussed on inclusive </a:t>
-            </a:r>
-            <a:r>
-              <a:rPr lang="en-CA" dirty="0" smtClean="0"/>
-              <a:t>design</a:t>
+              <a:t>Service Design project focussed on inclusive design</a:t>
             </a:r>
           </a:p>
           <a:p>
@@ -15950,7 +16170,6 @@
               <a:rPr lang="en-CA" dirty="0" smtClean="0"/>
               <a:t>Out reach and Accessibility 2024 </a:t>
             </a:r>
-            <a:endParaRPr lang="en-CA" dirty="0" smtClean="0"/>
           </a:p>
         </p:txBody>
       </p:sp>
@@ -16401,8 +16620,13 @@
           <a:p>
             <a:r>
               <a:rPr lang="en-CA" dirty="0" smtClean="0"/>
-              <a:t>Actual assistive devices (JAWS, NVDA, Dragon Naturally Speaking)</a:t>
-            </a:r>
+              <a:t>Actual assistive devices (JAWS, NVDA, Dragon Naturally </a:t>
+            </a:r>
+            <a:r>
+              <a:rPr lang="en-CA" dirty="0" smtClean="0"/>
+              <a:t>Speaking, Braille readers)</a:t>
+            </a:r>
+            <a:endParaRPr lang="en-CA" dirty="0" smtClean="0"/>
           </a:p>
           <a:p>
             <a:r>
@@ -16510,13 +16734,11 @@
             </a:pPr>
             <a:r>
               <a:rPr lang="en-CA" dirty="0" smtClean="0"/>
-              <a:t>Several categories of testing tools</a:t>
-            </a:r>
-          </a:p>
-          <a:p>
-            <a:r>
-              <a:rPr lang="en-CA" dirty="0" smtClean="0"/>
-              <a:t>Online (WAVE, </a:t>
+              <a:t>Online </a:t>
+            </a:r>
+            <a:r>
+              <a:rPr lang="en-CA" dirty="0" smtClean="0"/>
+              <a:t>(WAVE, </a:t>
             </a:r>
             <a:r>
               <a:rPr lang="en-CA" dirty="0" err="1" smtClean="0"/>
@@ -16642,8 +16864,13 @@
             <a:pPr lvl="1"/>
             <a:r>
               <a:rPr lang="en-CA" dirty="0" smtClean="0"/>
-              <a:t>Better for one off</a:t>
-            </a:r>
+              <a:t>Better for </a:t>
+            </a:r>
+            <a:r>
+              <a:rPr lang="en-CA" dirty="0" smtClean="0"/>
+              <a:t>manual one offs</a:t>
+            </a:r>
+            <a:endParaRPr lang="en-CA" dirty="0" smtClean="0"/>
           </a:p>
           <a:p>
             <a:pPr lvl="1"/>
@@ -16999,11 +17226,7 @@
           <a:p>
             <a:r>
               <a:rPr lang="en-CA" dirty="0" smtClean="0"/>
-              <a:t>Tools – </a:t>
-            </a:r>
-            <a:r>
-              <a:rPr lang="en-CA" dirty="0" smtClean="0"/>
-              <a:t>Automated Testing</a:t>
+              <a:t>Tools – Automated Testing</a:t>
             </a:r>
             <a:endParaRPr lang="en-CA" dirty="0"/>
           </a:p>
@@ -18965,21 +19188,6 @@
 </file>
 
 <file path=customXml/item1.xml><?xml version="1.0" encoding="utf-8"?>
-<p:properties xmlns:p="http://schemas.microsoft.com/office/2006/metadata/properties" xmlns:xsi="http://www.w3.org/2001/XMLSchema-instance" xmlns:pc="http://schemas.microsoft.com/office/infopath/2007/PartnerControls">
-  <documentManagement/>
-</p:properties>
-</file>
-
-<file path=customXml/item2.xml><?xml version="1.0" encoding="utf-8"?>
-<?mso-contentType ?>
-<FormTemplates xmlns="http://schemas.microsoft.com/sharepoint/v3/contenttype/forms">
-  <Display>DocumentLibraryForm</Display>
-  <Edit>DocumentLibraryForm</Edit>
-  <New>DocumentLibraryForm</New>
-</FormTemplates>
-</file>
-
-<file path=customXml/item3.xml><?xml version="1.0" encoding="utf-8"?>
 <ct:contentTypeSchema xmlns:ct="http://schemas.microsoft.com/office/2006/metadata/contentType" xmlns:ma="http://schemas.microsoft.com/office/2006/metadata/properties/metaAttributes" ct:_="" ma:_="" ma:contentTypeName="Document" ma:contentTypeID="0x01010010B8B88E69DC084DB4454BD303FC84A8" ma:contentTypeVersion="0" ma:contentTypeDescription="Create a new document." ma:contentTypeScope="" ma:versionID="1ecfcc0e9dc7a70c6e4f3ef885d95856">
   <xsd:schema xmlns:xsd="http://www.w3.org/2001/XMLSchema" xmlns:xs="http://www.w3.org/2001/XMLSchema" xmlns:p="http://schemas.microsoft.com/office/2006/metadata/properties" targetNamespace="http://schemas.microsoft.com/office/2006/metadata/properties" ma:root="true" ma:fieldsID="1648c5e0ecb366114e52100a5efdb160">
     <xsd:element name="properties">
@@ -19093,10 +19301,32 @@
 </ct:contentTypeSchema>
 </file>
 
+<file path=customXml/item2.xml><?xml version="1.0" encoding="utf-8"?>
+<?mso-contentType ?>
+<FormTemplates xmlns="http://schemas.microsoft.com/sharepoint/v3/contenttype/forms">
+  <Display>DocumentLibraryForm</Display>
+  <Edit>DocumentLibraryForm</Edit>
+  <New>DocumentLibraryForm</New>
+</FormTemplates>
+</file>
+
+<file path=customXml/item3.xml><?xml version="1.0" encoding="utf-8"?>
+<p:properties xmlns:p="http://schemas.microsoft.com/office/2006/metadata/properties" xmlns:xsi="http://www.w3.org/2001/XMLSchema-instance" xmlns:pc="http://schemas.microsoft.com/office/infopath/2007/PartnerControls">
+  <documentManagement/>
+</p:properties>
+</file>
+
 <file path=customXml/itemProps1.xml><?xml version="1.0" encoding="utf-8"?>
-<ds:datastoreItem xmlns:ds="http://schemas.openxmlformats.org/officeDocument/2006/customXml" ds:itemID="{5AAF29FC-63F9-4EC0-A194-DB5A0CAAC470}">
+<ds:datastoreItem xmlns:ds="http://schemas.openxmlformats.org/officeDocument/2006/customXml" ds:itemID="{C8F7BCDC-42FC-41AB-A454-1101C63034CE}">
   <ds:schemaRefs>
+    <ds:schemaRef ds:uri="http://schemas.microsoft.com/office/2006/metadata/contentType"/>
+    <ds:schemaRef ds:uri="http://schemas.microsoft.com/office/2006/metadata/properties/metaAttributes"/>
+    <ds:schemaRef ds:uri="http://www.w3.org/2001/XMLSchema"/>
     <ds:schemaRef ds:uri="http://schemas.microsoft.com/office/2006/metadata/properties"/>
+    <ds:schemaRef ds:uri="http://schemas.openxmlformats.org/package/2006/metadata/core-properties"/>
+    <ds:schemaRef ds:uri="http://purl.org/dc/elements/1.1/"/>
+    <ds:schemaRef ds:uri="http://purl.org/dc/terms/"/>
+    <ds:schemaRef ds:uri="http://schemas.microsoft.com/internal/obd"/>
     <ds:schemaRef ds:uri="http://schemas.microsoft.com/office/infopath/2007/PartnerControls"/>
   </ds:schemaRefs>
 </ds:datastoreItem>
@@ -19111,16 +19341,9 @@
 </file>
 
 <file path=customXml/itemProps3.xml><?xml version="1.0" encoding="utf-8"?>
-<ds:datastoreItem xmlns:ds="http://schemas.openxmlformats.org/officeDocument/2006/customXml" ds:itemID="{C8F7BCDC-42FC-41AB-A454-1101C63034CE}">
+<ds:datastoreItem xmlns:ds="http://schemas.openxmlformats.org/officeDocument/2006/customXml" ds:itemID="{5AAF29FC-63F9-4EC0-A194-DB5A0CAAC470}">
   <ds:schemaRefs>
-    <ds:schemaRef ds:uri="http://schemas.microsoft.com/office/2006/metadata/contentType"/>
-    <ds:schemaRef ds:uri="http://schemas.microsoft.com/office/2006/metadata/properties/metaAttributes"/>
-    <ds:schemaRef ds:uri="http://www.w3.org/2001/XMLSchema"/>
     <ds:schemaRef ds:uri="http://schemas.microsoft.com/office/2006/metadata/properties"/>
-    <ds:schemaRef ds:uri="http://schemas.openxmlformats.org/package/2006/metadata/core-properties"/>
-    <ds:schemaRef ds:uri="http://purl.org/dc/elements/1.1/"/>
-    <ds:schemaRef ds:uri="http://purl.org/dc/terms/"/>
-    <ds:schemaRef ds:uri="http://schemas.microsoft.com/internal/obd"/>
     <ds:schemaRef ds:uri="http://schemas.microsoft.com/office/infopath/2007/PartnerControls"/>
   </ds:schemaRefs>
 </ds:datastoreItem>

</xml_diff>